<commit_message>
pulizia codice e update presentazione
</commit_message>
<xml_diff>
--- a/presentazione.pptx
+++ b/presentazione.pptx
@@ -5,10 +5,10 @@
     <p:sldMasterId id="2147483717" r:id="rId4"/>
   </p:sldMasterIdLst>
   <p:notesMasterIdLst>
-    <p:notesMasterId r:id="rId18"/>
+    <p:notesMasterId r:id="rId19"/>
   </p:notesMasterIdLst>
   <p:handoutMasterIdLst>
-    <p:handoutMasterId r:id="rId19"/>
+    <p:handoutMasterId r:id="rId20"/>
   </p:handoutMasterIdLst>
   <p:sldIdLst>
     <p:sldId id="258" r:id="rId5"/>
@@ -20,10 +20,11 @@
     <p:sldId id="293" r:id="rId11"/>
     <p:sldId id="295" r:id="rId12"/>
     <p:sldId id="296" r:id="rId13"/>
-    <p:sldId id="294" r:id="rId14"/>
-    <p:sldId id="297" r:id="rId15"/>
-    <p:sldId id="298" r:id="rId16"/>
-    <p:sldId id="280" r:id="rId17"/>
+    <p:sldId id="297" r:id="rId14"/>
+    <p:sldId id="299" r:id="rId15"/>
+    <p:sldId id="300" r:id="rId16"/>
+    <p:sldId id="294" r:id="rId17"/>
+    <p:sldId id="280" r:id="rId18"/>
   </p:sldIdLst>
   <p:sldSz cx="12192000" cy="6858000"/>
   <p:notesSz cx="6858000" cy="9144000"/>
@@ -822,7 +823,7 @@
             <a:spLocks noGrp="1"/>
           </p:cNvSpPr>
           <p:nvPr>
-            <p:ph type="sldNum" sz="quarter" idx="10"/>
+            <p:ph type="sldNum" sz="quarter" idx="5"/>
           </p:nvPr>
         </p:nvSpPr>
         <p:spPr/>
@@ -833,7 +834,7 @@
             <a:pPr rtl="0"/>
             <a:fld id="{284ECAD9-32EE-4091-BDA5-6BD15ACC5E58}" type="slidenum">
               <a:rPr lang="it-IT" smtClean="0"/>
-              <a:t>10</a:t>
+              <a:t>11</a:t>
             </a:fld>
             <a:endParaRPr lang="it-IT" dirty="0"/>
           </a:p>
@@ -842,7 +843,7 @@
     </p:spTree>
     <p:extLst>
       <p:ext uri="{BB962C8B-B14F-4D97-AF65-F5344CB8AC3E}">
-        <p14:creationId xmlns:p14="http://schemas.microsoft.com/office/powerpoint/2010/main" val="196969414"/>
+        <p14:creationId xmlns:p14="http://schemas.microsoft.com/office/powerpoint/2010/main" val="3322397853"/>
       </p:ext>
     </p:extLst>
   </p:cSld>
@@ -919,7 +920,179 @@
             <a:pPr rtl="0"/>
             <a:fld id="{284ECAD9-32EE-4091-BDA5-6BD15ACC5E58}" type="slidenum">
               <a:rPr lang="it-IT" smtClean="0"/>
+              <a:t>12</a:t>
+            </a:fld>
+            <a:endParaRPr lang="it-IT" dirty="0"/>
+          </a:p>
+        </p:txBody>
+      </p:sp>
+    </p:spTree>
+    <p:extLst>
+      <p:ext uri="{BB962C8B-B14F-4D97-AF65-F5344CB8AC3E}">
+        <p14:creationId xmlns:p14="http://schemas.microsoft.com/office/powerpoint/2010/main" val="3717284432"/>
+      </p:ext>
+    </p:extLst>
+  </p:cSld>
+  <p:clrMapOvr>
+    <a:masterClrMapping/>
+  </p:clrMapOvr>
+</p:notes>
+</file>
+
+<file path=ppt/notesSlides/notesSlide12.xml><?xml version="1.0" encoding="utf-8"?>
+<p:notes xmlns:a="http://schemas.openxmlformats.org/drawingml/2006/main" xmlns:r="http://schemas.openxmlformats.org/officeDocument/2006/relationships" xmlns:p="http://schemas.openxmlformats.org/presentationml/2006/main">
+  <p:cSld>
+    <p:spTree>
+      <p:nvGrpSpPr>
+        <p:cNvPr id="1" name=""/>
+        <p:cNvGrpSpPr/>
+        <p:nvPr/>
+      </p:nvGrpSpPr>
+      <p:grpSpPr>
+        <a:xfrm>
+          <a:off x="0" y="0"/>
+          <a:ext cx="0" cy="0"/>
+          <a:chOff x="0" y="0"/>
+          <a:chExt cx="0" cy="0"/>
+        </a:xfrm>
+      </p:grpSpPr>
+      <p:sp>
+        <p:nvSpPr>
+          <p:cNvPr id="2" name="Segnaposto immagine diapositiva 1"/>
+          <p:cNvSpPr>
+            <a:spLocks noGrp="1" noRot="1" noChangeAspect="1"/>
+          </p:cNvSpPr>
+          <p:nvPr>
+            <p:ph type="sldImg"/>
+          </p:nvPr>
+        </p:nvSpPr>
+        <p:spPr/>
+      </p:sp>
+      <p:sp>
+        <p:nvSpPr>
+          <p:cNvPr id="3" name="Segnaposto note 2"/>
+          <p:cNvSpPr>
+            <a:spLocks noGrp="1"/>
+          </p:cNvSpPr>
+          <p:nvPr>
+            <p:ph type="body" idx="1"/>
+          </p:nvPr>
+        </p:nvSpPr>
+        <p:spPr/>
+        <p:txBody>
+          <a:bodyPr rtlCol="0"/>
+          <a:lstStyle/>
+          <a:p>
+            <a:pPr rtl="0"/>
+            <a:endParaRPr lang="it-IT" dirty="0"/>
+          </a:p>
+        </p:txBody>
+      </p:sp>
+      <p:sp>
+        <p:nvSpPr>
+          <p:cNvPr id="4" name="Segnaposto numero diapositiva 3"/>
+          <p:cNvSpPr>
+            <a:spLocks noGrp="1"/>
+          </p:cNvSpPr>
+          <p:nvPr>
+            <p:ph type="sldNum" sz="quarter" idx="10"/>
+          </p:nvPr>
+        </p:nvSpPr>
+        <p:spPr/>
+        <p:txBody>
+          <a:bodyPr rtlCol="0"/>
+          <a:lstStyle/>
+          <a:p>
+            <a:pPr rtl="0"/>
+            <a:fld id="{284ECAD9-32EE-4091-BDA5-6BD15ACC5E58}" type="slidenum">
+              <a:rPr lang="it-IT" smtClean="0"/>
               <a:t>13</a:t>
+            </a:fld>
+            <a:endParaRPr lang="it-IT" dirty="0"/>
+          </a:p>
+        </p:txBody>
+      </p:sp>
+    </p:spTree>
+    <p:extLst>
+      <p:ext uri="{BB962C8B-B14F-4D97-AF65-F5344CB8AC3E}">
+        <p14:creationId xmlns:p14="http://schemas.microsoft.com/office/powerpoint/2010/main" val="196969414"/>
+      </p:ext>
+    </p:extLst>
+  </p:cSld>
+  <p:clrMapOvr>
+    <a:masterClrMapping/>
+  </p:clrMapOvr>
+</p:notes>
+</file>
+
+<file path=ppt/notesSlides/notesSlide13.xml><?xml version="1.0" encoding="utf-8"?>
+<p:notes xmlns:a="http://schemas.openxmlformats.org/drawingml/2006/main" xmlns:r="http://schemas.openxmlformats.org/officeDocument/2006/relationships" xmlns:p="http://schemas.openxmlformats.org/presentationml/2006/main">
+  <p:cSld>
+    <p:spTree>
+      <p:nvGrpSpPr>
+        <p:cNvPr id="1" name=""/>
+        <p:cNvGrpSpPr/>
+        <p:nvPr/>
+      </p:nvGrpSpPr>
+      <p:grpSpPr>
+        <a:xfrm>
+          <a:off x="0" y="0"/>
+          <a:ext cx="0" cy="0"/>
+          <a:chOff x="0" y="0"/>
+          <a:chExt cx="0" cy="0"/>
+        </a:xfrm>
+      </p:grpSpPr>
+      <p:sp>
+        <p:nvSpPr>
+          <p:cNvPr id="2" name="Segnaposto immagine diapositiva 1"/>
+          <p:cNvSpPr>
+            <a:spLocks noGrp="1" noRot="1" noChangeAspect="1"/>
+          </p:cNvSpPr>
+          <p:nvPr>
+            <p:ph type="sldImg"/>
+          </p:nvPr>
+        </p:nvSpPr>
+        <p:spPr/>
+      </p:sp>
+      <p:sp>
+        <p:nvSpPr>
+          <p:cNvPr id="3" name="Segnaposto note 2"/>
+          <p:cNvSpPr>
+            <a:spLocks noGrp="1"/>
+          </p:cNvSpPr>
+          <p:nvPr>
+            <p:ph type="body" idx="1"/>
+          </p:nvPr>
+        </p:nvSpPr>
+        <p:spPr/>
+        <p:txBody>
+          <a:bodyPr rtlCol="0"/>
+          <a:lstStyle/>
+          <a:p>
+            <a:pPr rtl="0"/>
+            <a:endParaRPr lang="it-IT" dirty="0"/>
+          </a:p>
+        </p:txBody>
+      </p:sp>
+      <p:sp>
+        <p:nvSpPr>
+          <p:cNvPr id="4" name="Segnaposto numero diapositiva 3"/>
+          <p:cNvSpPr>
+            <a:spLocks noGrp="1"/>
+          </p:cNvSpPr>
+          <p:nvPr>
+            <p:ph type="sldNum" sz="quarter" idx="5"/>
+          </p:nvPr>
+        </p:nvSpPr>
+        <p:spPr/>
+        <p:txBody>
+          <a:bodyPr rtlCol="0"/>
+          <a:lstStyle/>
+          <a:p>
+            <a:pPr rtl="0"/>
+            <a:fld id="{284ECAD9-32EE-4091-BDA5-6BD15ACC5E58}" type="slidenum">
+              <a:rPr lang="it-IT" smtClean="0"/>
+              <a:t>14</a:t>
             </a:fld>
             <a:endParaRPr lang="it-IT" dirty="0"/>
           </a:p>
@@ -9947,6 +10120,201 @@
 <file path=ppt/slides/slide10.xml><?xml version="1.0" encoding="utf-8"?>
 <p:sld xmlns:a="http://schemas.openxmlformats.org/drawingml/2006/main" xmlns:r="http://schemas.openxmlformats.org/officeDocument/2006/relationships" xmlns:p="http://schemas.openxmlformats.org/presentationml/2006/main">
   <p:cSld>
+    <p:spTree>
+      <p:nvGrpSpPr>
+        <p:cNvPr id="1" name=""/>
+        <p:cNvGrpSpPr/>
+        <p:nvPr/>
+      </p:nvGrpSpPr>
+      <p:grpSpPr>
+        <a:xfrm>
+          <a:off x="0" y="0"/>
+          <a:ext cx="0" cy="0"/>
+          <a:chOff x="0" y="0"/>
+          <a:chExt cx="0" cy="0"/>
+        </a:xfrm>
+      </p:grpSpPr>
+      <p:sp>
+        <p:nvSpPr>
+          <p:cNvPr id="2" name="Titolo 1">
+            <a:extLst>
+              <a:ext uri="{FF2B5EF4-FFF2-40B4-BE49-F238E27FC236}">
+                <a16:creationId xmlns:a16="http://schemas.microsoft.com/office/drawing/2014/main" id="{F90817C5-BA9F-44BE-A457-FE4C2D312809}"/>
+              </a:ext>
+            </a:extLst>
+          </p:cNvPr>
+          <p:cNvSpPr>
+            <a:spLocks noGrp="1"/>
+          </p:cNvSpPr>
+          <p:nvPr>
+            <p:ph type="title"/>
+          </p:nvPr>
+        </p:nvSpPr>
+        <p:spPr/>
+        <p:txBody>
+          <a:bodyPr/>
+          <a:lstStyle/>
+          <a:p>
+            <a:r>
+              <a:rPr lang="it-IT" dirty="0"/>
+              <a:t>Gestione degli errori</a:t>
+            </a:r>
+          </a:p>
+        </p:txBody>
+      </p:sp>
+      <p:sp>
+        <p:nvSpPr>
+          <p:cNvPr id="3" name="Segnaposto contenuto 2">
+            <a:extLst>
+              <a:ext uri="{FF2B5EF4-FFF2-40B4-BE49-F238E27FC236}">
+                <a16:creationId xmlns:a16="http://schemas.microsoft.com/office/drawing/2014/main" id="{9596A2F2-6954-40BF-B413-862D88F08506}"/>
+              </a:ext>
+            </a:extLst>
+          </p:cNvPr>
+          <p:cNvSpPr>
+            <a:spLocks noGrp="1"/>
+          </p:cNvSpPr>
+          <p:nvPr>
+            <p:ph idx="1"/>
+          </p:nvPr>
+        </p:nvSpPr>
+        <p:spPr/>
+        <p:txBody>
+          <a:bodyPr/>
+          <a:lstStyle/>
+          <a:p>
+            <a:r>
+              <a:rPr lang="it-IT" sz="2400" dirty="0">
+                <a:latin typeface="+mj-lt"/>
+              </a:rPr>
+              <a:t>Vengono effettuati controlli sulla presenza e correttezza degli </a:t>
+            </a:r>
+            <a:r>
+              <a:rPr lang="it-IT" sz="2400" dirty="0" err="1">
+                <a:latin typeface="+mj-lt"/>
+              </a:rPr>
+              <a:t>Header</a:t>
+            </a:r>
+            <a:r>
+              <a:rPr lang="it-IT" sz="2400" dirty="0">
+                <a:latin typeface="+mj-lt"/>
+              </a:rPr>
+              <a:t> e si controlla che ogni campo contenente le informazioni del brano sia di lunghezza pari a 30 caratteri.</a:t>
+            </a:r>
+          </a:p>
+          <a:p>
+            <a:r>
+              <a:rPr lang="it-IT" sz="2400" dirty="0">
+                <a:latin typeface="+mj-lt"/>
+              </a:rPr>
+              <a:t>Sfruttiamo il riconoscimento delle eccezioni di ANTLR per capire che tipo di errore riceviamo durante il </a:t>
+            </a:r>
+            <a:r>
+              <a:rPr lang="it-IT" sz="2400" dirty="0" err="1">
+                <a:latin typeface="+mj-lt"/>
+              </a:rPr>
+              <a:t>parsing</a:t>
+            </a:r>
+            <a:endParaRPr lang="it-IT" dirty="0"/>
+          </a:p>
+          <a:p>
+            <a:r>
+              <a:rPr lang="it-IT" sz="2400" dirty="0">
+                <a:latin typeface="+mj-lt"/>
+              </a:rPr>
+              <a:t>Alcuni esempi:</a:t>
+            </a:r>
+          </a:p>
+          <a:p>
+            <a:pPr lvl="1"/>
+            <a:r>
+              <a:rPr lang="it-IT" sz="2200" dirty="0">
+                <a:latin typeface="+mj-lt"/>
+              </a:rPr>
+              <a:t>Mancanza o errata scrittura del TAG iniziale</a:t>
+            </a:r>
+          </a:p>
+          <a:p>
+            <a:endParaRPr lang="it-IT" dirty="0"/>
+          </a:p>
+        </p:txBody>
+      </p:sp>
+      <p:sp>
+        <p:nvSpPr>
+          <p:cNvPr id="4" name="Segnaposto numero diapositiva 3">
+            <a:extLst>
+              <a:ext uri="{FF2B5EF4-FFF2-40B4-BE49-F238E27FC236}">
+                <a16:creationId xmlns:a16="http://schemas.microsoft.com/office/drawing/2014/main" id="{2B13E80C-7F0E-4294-A3F9-CBF165A75956}"/>
+              </a:ext>
+            </a:extLst>
+          </p:cNvPr>
+          <p:cNvSpPr>
+            <a:spLocks noGrp="1"/>
+          </p:cNvSpPr>
+          <p:nvPr>
+            <p:ph type="sldNum" sz="quarter" idx="12"/>
+          </p:nvPr>
+        </p:nvSpPr>
+        <p:spPr/>
+        <p:txBody>
+          <a:bodyPr/>
+          <a:lstStyle/>
+          <a:p>
+            <a:pPr rtl="0"/>
+            <a:fld id="{3A98EE3D-8CD1-4C3F-BD1C-C98C9596463C}" type="slidenum">
+              <a:rPr lang="it-IT" noProof="0" smtClean="0"/>
+              <a:t>10</a:t>
+            </a:fld>
+            <a:endParaRPr lang="it-IT" noProof="0" dirty="0"/>
+          </a:p>
+        </p:txBody>
+      </p:sp>
+      <p:pic>
+        <p:nvPicPr>
+          <p:cNvPr id="6" name="Immagine 5">
+            <a:extLst>
+              <a:ext uri="{FF2B5EF4-FFF2-40B4-BE49-F238E27FC236}">
+                <a16:creationId xmlns:a16="http://schemas.microsoft.com/office/drawing/2014/main" id="{D6A62E99-94CE-4219-B69B-E1B6C2FA2D4F}"/>
+              </a:ext>
+            </a:extLst>
+          </p:cNvPr>
+          <p:cNvPicPr>
+            <a:picLocks noChangeAspect="1"/>
+          </p:cNvPicPr>
+          <p:nvPr/>
+        </p:nvPicPr>
+        <p:blipFill>
+          <a:blip r:embed="rId2"/>
+          <a:stretch>
+            <a:fillRect/>
+          </a:stretch>
+        </p:blipFill>
+        <p:spPr>
+          <a:xfrm>
+            <a:off x="1263600" y="5095791"/>
+            <a:ext cx="9112070" cy="480285"/>
+          </a:xfrm>
+          <a:prstGeom prst="rect">
+            <a:avLst/>
+          </a:prstGeom>
+        </p:spPr>
+      </p:pic>
+    </p:spTree>
+    <p:extLst>
+      <p:ext uri="{BB962C8B-B14F-4D97-AF65-F5344CB8AC3E}">
+        <p14:creationId xmlns:p14="http://schemas.microsoft.com/office/powerpoint/2010/main" val="2079372548"/>
+      </p:ext>
+    </p:extLst>
+  </p:cSld>
+  <p:clrMapOvr>
+    <a:masterClrMapping/>
+  </p:clrMapOvr>
+</p:sld>
+</file>
+
+<file path=ppt/slides/slide11.xml><?xml version="1.0" encoding="utf-8"?>
+<p:sld xmlns:a="http://schemas.openxmlformats.org/drawingml/2006/main" xmlns:r="http://schemas.openxmlformats.org/officeDocument/2006/relationships" xmlns:p="http://schemas.openxmlformats.org/presentationml/2006/main">
+  <p:cSld>
     <p:bg>
       <p:bgPr>
         <a:solidFill>
@@ -9971,99 +10339,41 @@
       </p:grpSpPr>
       <p:sp>
         <p:nvSpPr>
-          <p:cNvPr id="6" name="Titolo 5">
-            <a:extLst>
-              <a:ext uri="{FF2B5EF4-FFF2-40B4-BE49-F238E27FC236}">
-                <a16:creationId xmlns:a16="http://schemas.microsoft.com/office/drawing/2014/main" id="{CE09A200-4838-4284-BD1E-19701CABB5FE}"/>
-              </a:ext>
-            </a:extLst>
-          </p:cNvPr>
-          <p:cNvSpPr>
-            <a:spLocks noGrp="1"/>
-          </p:cNvSpPr>
-          <p:nvPr>
-            <p:ph type="title"/>
-          </p:nvPr>
-        </p:nvSpPr>
-        <p:spPr>
-          <a:xfrm>
-            <a:off x="1097280" y="286603"/>
-            <a:ext cx="10058400" cy="1450757"/>
-          </a:xfrm>
-        </p:spPr>
-        <p:txBody>
-          <a:bodyPr rtlCol="0">
-            <a:normAutofit/>
-          </a:bodyPr>
-          <a:lstStyle/>
-          <a:p>
-            <a:pPr rtl="0"/>
-            <a:r>
-              <a:rPr lang="it-IT" dirty="0"/>
-              <a:t>Grammatica con non terminali</a:t>
-            </a:r>
-          </a:p>
-        </p:txBody>
-      </p:sp>
-      <p:pic>
-        <p:nvPicPr>
-          <p:cNvPr id="4" name="Elemento grafico 3">
-            <a:extLst>
-              <a:ext uri="{FF2B5EF4-FFF2-40B4-BE49-F238E27FC236}">
-                <a16:creationId xmlns:a16="http://schemas.microsoft.com/office/drawing/2014/main" id="{ED0A95A1-BC85-4809-B935-6A9B3C054422}"/>
-              </a:ext>
-            </a:extLst>
-          </p:cNvPr>
-          <p:cNvPicPr>
-            <a:picLocks noChangeAspect="1"/>
-          </p:cNvPicPr>
-          <p:nvPr/>
-        </p:nvPicPr>
-        <p:blipFill>
-          <a:blip r:embed="rId3" cstate="print">
-            <a:extLst>
-              <a:ext uri="{28A0092B-C50C-407E-A947-70E740481C1C}">
-                <a14:useLocalDpi xmlns:a14="http://schemas.microsoft.com/office/drawing/2010/main" val="0"/>
-              </a:ext>
-              <a:ext uri="{96DAC541-7B7A-43D3-8B79-37D633B846F1}">
-                <asvg:svgBlip xmlns:asvg="http://schemas.microsoft.com/office/drawing/2016/SVG/main" r:embed="rId4"/>
-              </a:ext>
-            </a:extLst>
-          </a:blip>
-          <a:stretch>
-            <a:fillRect/>
-          </a:stretch>
-        </p:blipFill>
-        <p:spPr>
-          <a:xfrm>
-            <a:off x="207095" y="6043750"/>
-            <a:ext cx="1770209" cy="700341"/>
+          <p:cNvPr id="26" name="Rettangolo 28">
+            <a:extLst>
+              <a:ext uri="{FF2B5EF4-FFF2-40B4-BE49-F238E27FC236}">
+                <a16:creationId xmlns:a16="http://schemas.microsoft.com/office/drawing/2014/main" id="{416A0E3C-60E6-4F39-BC55-5F7C224E1F7C}"/>
+              </a:ext>
+              <a:ext uri="{C183D7F6-B498-43B3-948B-1728B52AA6E4}">
+                <adec:decorative xmlns:adec="http://schemas.microsoft.com/office/drawing/2017/decorative" val="1"/>
+              </a:ext>
+            </a:extLst>
+          </p:cNvPr>
+          <p:cNvSpPr>
+            <a:spLocks noGrp="1" noRot="1" noChangeAspect="1" noMove="1" noResize="1" noEditPoints="1" noAdjustHandles="1" noChangeArrowheads="1" noChangeShapeType="1" noTextEdit="1"/>
+          </p:cNvSpPr>
+          <p:nvPr>
+            <p:extLst>
+              <p:ext uri="{386F3935-93C4-4BCD-93E2-E3B085C9AB24}">
+                <p16:designElem xmlns:p16="http://schemas.microsoft.com/office/powerpoint/2015/main" val="1"/>
+              </p:ext>
+            </p:extLst>
+          </p:nvPr>
+        </p:nvSpPr>
+        <p:spPr>
+          <a:xfrm>
+            <a:off x="3175" y="6400800"/>
+            <a:ext cx="12188825" cy="457200"/>
           </a:xfrm>
           <a:prstGeom prst="rect">
             <a:avLst/>
           </a:prstGeom>
-        </p:spPr>
-      </p:pic>
-      <p:sp>
-        <p:nvSpPr>
-          <p:cNvPr id="10" name="Connettore 9">
-            <a:extLst>
-              <a:ext uri="{FF2B5EF4-FFF2-40B4-BE49-F238E27FC236}">
-                <a16:creationId xmlns:a16="http://schemas.microsoft.com/office/drawing/2014/main" id="{7DA3C5E2-1B7C-406E-9A80-B7F344044586}"/>
-              </a:ext>
-            </a:extLst>
-          </p:cNvPr>
-          <p:cNvSpPr/>
-          <p:nvPr/>
-        </p:nvSpPr>
-        <p:spPr>
-          <a:xfrm>
-            <a:off x="11455401" y="6273800"/>
-            <a:ext cx="512910" cy="470291"/>
-          </a:xfrm>
-          <a:prstGeom prst="flowChartConnector">
-            <a:avLst/>
-          </a:prstGeom>
+          <a:solidFill>
+            <a:srgbClr val="262626"/>
+          </a:solidFill>
+          <a:ln>
+            <a:noFill/>
+          </a:ln>
         </p:spPr>
         <p:style>
           <a:lnRef idx="2">
@@ -10081,6 +10391,350 @@
             <a:schemeClr val="lt1"/>
           </a:fontRef>
         </p:style>
+      </p:sp>
+      <p:cxnSp>
+        <p:nvCxnSpPr>
+          <p:cNvPr id="27" name="Connettore diritto 30">
+            <a:extLst>
+              <a:ext uri="{FF2B5EF4-FFF2-40B4-BE49-F238E27FC236}">
+                <a16:creationId xmlns:a16="http://schemas.microsoft.com/office/drawing/2014/main" id="{C5025DAC-8B93-4160-B017-3A274A5828C0}"/>
+              </a:ext>
+              <a:ext uri="{C183D7F6-B498-43B3-948B-1728B52AA6E4}">
+                <adec:decorative xmlns:adec="http://schemas.microsoft.com/office/drawing/2017/decorative" val="1"/>
+              </a:ext>
+            </a:extLst>
+          </p:cNvPr>
+          <p:cNvCxnSpPr>
+            <a:cxnSpLocks noGrp="1" noRot="1" noChangeAspect="1" noMove="1" noResize="1" noEditPoints="1" noAdjustHandles="1" noChangeArrowheads="1" noChangeShapeType="1"/>
+          </p:cNvCxnSpPr>
+          <p:nvPr>
+            <p:extLst>
+              <p:ext uri="{386F3935-93C4-4BCD-93E2-E3B085C9AB24}">
+                <p16:designElem xmlns:p16="http://schemas.microsoft.com/office/powerpoint/2015/main" val="1"/>
+              </p:ext>
+            </p:extLst>
+          </p:nvPr>
+        </p:nvCxnSpPr>
+        <p:spPr>
+          <a:xfrm>
+            <a:off x="1193532" y="1897380"/>
+            <a:ext cx="9966960" cy="0"/>
+          </a:xfrm>
+          <a:prstGeom prst="line">
+            <a:avLst/>
+          </a:prstGeom>
+          <a:ln w="12700">
+            <a:solidFill>
+              <a:schemeClr val="tx1">
+                <a:lumMod val="75000"/>
+                <a:lumOff val="25000"/>
+              </a:schemeClr>
+            </a:solidFill>
+          </a:ln>
+        </p:spPr>
+        <p:style>
+          <a:lnRef idx="1">
+            <a:schemeClr val="accent1"/>
+          </a:lnRef>
+          <a:fillRef idx="0">
+            <a:schemeClr val="accent1"/>
+          </a:fillRef>
+          <a:effectRef idx="0">
+            <a:schemeClr val="accent1"/>
+          </a:effectRef>
+          <a:fontRef idx="minor">
+            <a:schemeClr val="tx1"/>
+          </a:fontRef>
+        </p:style>
+      </p:cxnSp>
+      <p:sp useBgFill="1">
+        <p:nvSpPr>
+          <p:cNvPr id="28" name="Rettangolo 32">
+            <a:extLst>
+              <a:ext uri="{FF2B5EF4-FFF2-40B4-BE49-F238E27FC236}">
+                <a16:creationId xmlns:a16="http://schemas.microsoft.com/office/drawing/2014/main" id="{990D0034-F768-41E7-85D4-F38C4DE85770}"/>
+              </a:ext>
+              <a:ext uri="{C183D7F6-B498-43B3-948B-1728B52AA6E4}">
+                <adec:decorative xmlns:adec="http://schemas.microsoft.com/office/drawing/2017/decorative" val="1"/>
+              </a:ext>
+            </a:extLst>
+          </p:cNvPr>
+          <p:cNvSpPr>
+            <a:spLocks noGrp="1" noRot="1" noChangeAspect="1" noMove="1" noResize="1" noEditPoints="1" noAdjustHandles="1" noChangeArrowheads="1" noChangeShapeType="1" noTextEdit="1"/>
+          </p:cNvSpPr>
+          <p:nvPr>
+            <p:extLst>
+              <p:ext uri="{386F3935-93C4-4BCD-93E2-E3B085C9AB24}">
+                <p16:designElem xmlns:p16="http://schemas.microsoft.com/office/powerpoint/2015/main" val="1"/>
+              </p:ext>
+            </p:extLst>
+          </p:nvPr>
+        </p:nvSpPr>
+        <p:spPr>
+          <a:xfrm>
+            <a:off x="0" y="0"/>
+            <a:ext cx="12186315" cy="6858000"/>
+          </a:xfrm>
+          <a:prstGeom prst="rect">
+            <a:avLst/>
+          </a:prstGeom>
+          <a:ln>
+            <a:noFill/>
+          </a:ln>
+        </p:spPr>
+        <p:style>
+          <a:lnRef idx="2">
+            <a:schemeClr val="accent6">
+              <a:shade val="50000"/>
+            </a:schemeClr>
+          </a:lnRef>
+          <a:fillRef idx="1001">
+            <a:schemeClr val="lt1"/>
+          </a:fillRef>
+          <a:effectRef idx="0">
+            <a:schemeClr val="accent6"/>
+          </a:effectRef>
+          <a:fontRef idx="minor">
+            <a:schemeClr val="lt1"/>
+          </a:fontRef>
+        </p:style>
+        <p:txBody>
+          <a:bodyPr rtlCol="0" anchor="ctr"/>
+          <a:lstStyle/>
+          <a:p>
+            <a:pPr algn="ctr" rtl="0"/>
+            <a:endParaRPr lang="it-IT" dirty="0"/>
+          </a:p>
+        </p:txBody>
+      </p:sp>
+      <p:sp>
+        <p:nvSpPr>
+          <p:cNvPr id="5" name="Titolo 4">
+            <a:extLst>
+              <a:ext uri="{FF2B5EF4-FFF2-40B4-BE49-F238E27FC236}">
+                <a16:creationId xmlns:a16="http://schemas.microsoft.com/office/drawing/2014/main" id="{B8B72B13-069B-4F8A-9437-FA58C3F1D44B}"/>
+              </a:ext>
+            </a:extLst>
+          </p:cNvPr>
+          <p:cNvSpPr>
+            <a:spLocks noGrp="1"/>
+          </p:cNvSpPr>
+          <p:nvPr>
+            <p:ph type="title"/>
+          </p:nvPr>
+        </p:nvSpPr>
+        <p:spPr>
+          <a:xfrm>
+            <a:off x="590927" y="535936"/>
+            <a:ext cx="10864474" cy="700340"/>
+          </a:xfrm>
+        </p:spPr>
+        <p:txBody>
+          <a:bodyPr vert="horz" lIns="91440" tIns="45720" rIns="91440" bIns="45720" rtlCol="0" anchor="b">
+            <a:noAutofit/>
+          </a:bodyPr>
+          <a:lstStyle/>
+          <a:p>
+            <a:pPr rtl="0"/>
+            <a:r>
+              <a:rPr lang="it-IT" sz="4400" dirty="0">
+                <a:solidFill>
+                  <a:schemeClr val="tx1">
+                    <a:lumMod val="75000"/>
+                    <a:lumOff val="25000"/>
+                  </a:schemeClr>
+                </a:solidFill>
+              </a:rPr>
+              <a:t>Gestione degli errori</a:t>
+            </a:r>
+          </a:p>
+        </p:txBody>
+      </p:sp>
+      <p:cxnSp>
+        <p:nvCxnSpPr>
+          <p:cNvPr id="30" name="Connettore diritto 34">
+            <a:extLst>
+              <a:ext uri="{FF2B5EF4-FFF2-40B4-BE49-F238E27FC236}">
+                <a16:creationId xmlns:a16="http://schemas.microsoft.com/office/drawing/2014/main" id="{5A0A5CF6-407C-4691-8122-49DF69D0020D}"/>
+              </a:ext>
+              <a:ext uri="{C183D7F6-B498-43B3-948B-1728B52AA6E4}">
+                <adec:decorative xmlns:adec="http://schemas.microsoft.com/office/drawing/2017/decorative" val="1"/>
+              </a:ext>
+            </a:extLst>
+          </p:cNvPr>
+          <p:cNvCxnSpPr>
+            <a:cxnSpLocks noGrp="1" noRot="1" noChangeAspect="1" noMove="1" noResize="1" noEditPoints="1" noAdjustHandles="1" noChangeArrowheads="1" noChangeShapeType="1"/>
+          </p:cNvCxnSpPr>
+          <p:nvPr>
+            <p:extLst>
+              <p:ext uri="{386F3935-93C4-4BCD-93E2-E3B085C9AB24}">
+                <p16:designElem xmlns:p16="http://schemas.microsoft.com/office/powerpoint/2015/main" val="1"/>
+              </p:ext>
+            </p:extLst>
+          </p:nvPr>
+        </p:nvCxnSpPr>
+        <p:spPr>
+          <a:xfrm>
+            <a:off x="590927" y="2633962"/>
+            <a:ext cx="2834640" cy="0"/>
+          </a:xfrm>
+          <a:prstGeom prst="line">
+            <a:avLst/>
+          </a:prstGeom>
+          <a:ln w="12700">
+            <a:solidFill>
+              <a:schemeClr val="tx1">
+                <a:lumMod val="75000"/>
+                <a:lumOff val="25000"/>
+              </a:schemeClr>
+            </a:solidFill>
+          </a:ln>
+        </p:spPr>
+        <p:style>
+          <a:lnRef idx="1">
+            <a:schemeClr val="accent1"/>
+          </a:lnRef>
+          <a:fillRef idx="0">
+            <a:schemeClr val="accent1"/>
+          </a:fillRef>
+          <a:effectRef idx="0">
+            <a:schemeClr val="accent1"/>
+          </a:effectRef>
+          <a:fontRef idx="minor">
+            <a:schemeClr val="tx1"/>
+          </a:fontRef>
+        </p:style>
+      </p:cxnSp>
+      <p:sp>
+        <p:nvSpPr>
+          <p:cNvPr id="4" name="Rettangolo 3">
+            <a:extLst>
+              <a:ext uri="{FF2B5EF4-FFF2-40B4-BE49-F238E27FC236}">
+                <a16:creationId xmlns:a16="http://schemas.microsoft.com/office/drawing/2014/main" id="{D22E5227-66DC-4545-A93A-3BAE57987144}"/>
+              </a:ext>
+            </a:extLst>
+          </p:cNvPr>
+          <p:cNvSpPr/>
+          <p:nvPr/>
+        </p:nvSpPr>
+        <p:spPr>
+          <a:xfrm>
+            <a:off x="590927" y="2477070"/>
+            <a:ext cx="2955837" cy="457195"/>
+          </a:xfrm>
+          <a:prstGeom prst="rect">
+            <a:avLst/>
+          </a:prstGeom>
+          <a:solidFill>
+            <a:schemeClr val="bg1"/>
+          </a:solidFill>
+          <a:ln>
+            <a:solidFill>
+              <a:schemeClr val="bg1"/>
+            </a:solidFill>
+          </a:ln>
+        </p:spPr>
+        <p:style>
+          <a:lnRef idx="2">
+            <a:schemeClr val="accent1">
+              <a:shade val="50000"/>
+            </a:schemeClr>
+          </a:lnRef>
+          <a:fillRef idx="1">
+            <a:schemeClr val="accent1"/>
+          </a:fillRef>
+          <a:effectRef idx="0">
+            <a:schemeClr val="accent1"/>
+          </a:effectRef>
+          <a:fontRef idx="minor">
+            <a:schemeClr val="lt1"/>
+          </a:fontRef>
+        </p:style>
+        <p:txBody>
+          <a:bodyPr rtlCol="0" anchor="ctr"/>
+          <a:lstStyle/>
+          <a:p>
+            <a:pPr algn="ctr"/>
+            <a:endParaRPr lang="it-IT"/>
+          </a:p>
+        </p:txBody>
+      </p:sp>
+      <p:pic>
+        <p:nvPicPr>
+          <p:cNvPr id="10" name="Elemento grafico 9">
+            <a:extLst>
+              <a:ext uri="{FF2B5EF4-FFF2-40B4-BE49-F238E27FC236}">
+                <a16:creationId xmlns:a16="http://schemas.microsoft.com/office/drawing/2014/main" id="{54A47743-7725-4A33-93CA-EFB89C10D1EC}"/>
+              </a:ext>
+            </a:extLst>
+          </p:cNvPr>
+          <p:cNvPicPr>
+            <a:picLocks noChangeAspect="1"/>
+          </p:cNvPicPr>
+          <p:nvPr/>
+        </p:nvPicPr>
+        <p:blipFill>
+          <a:blip r:embed="rId3" cstate="print">
+            <a:extLst>
+              <a:ext uri="{28A0092B-C50C-407E-A947-70E740481C1C}">
+                <a14:useLocalDpi xmlns:a14="http://schemas.microsoft.com/office/drawing/2010/main" val="0"/>
+              </a:ext>
+              <a:ext uri="{96DAC541-7B7A-43D3-8B79-37D633B846F1}">
+                <asvg:svgBlip xmlns:asvg="http://schemas.microsoft.com/office/drawing/2016/SVG/main" r:embed="rId4"/>
+              </a:ext>
+            </a:extLst>
+          </a:blip>
+          <a:stretch>
+            <a:fillRect/>
+          </a:stretch>
+        </p:blipFill>
+        <p:spPr>
+          <a:xfrm>
+            <a:off x="207095" y="6043750"/>
+            <a:ext cx="1770209" cy="700341"/>
+          </a:xfrm>
+          <a:prstGeom prst="rect">
+            <a:avLst/>
+          </a:prstGeom>
+        </p:spPr>
+      </p:pic>
+      <p:sp>
+        <p:nvSpPr>
+          <p:cNvPr id="12" name="Connettore 11">
+            <a:extLst>
+              <a:ext uri="{FF2B5EF4-FFF2-40B4-BE49-F238E27FC236}">
+                <a16:creationId xmlns:a16="http://schemas.microsoft.com/office/drawing/2014/main" id="{92095D8C-8CCA-4CC6-B2D2-E1BC4732F321}"/>
+              </a:ext>
+            </a:extLst>
+          </p:cNvPr>
+          <p:cNvSpPr/>
+          <p:nvPr/>
+        </p:nvSpPr>
+        <p:spPr>
+          <a:xfrm>
+            <a:off x="11455401" y="6273800"/>
+            <a:ext cx="512910" cy="470291"/>
+          </a:xfrm>
+          <a:prstGeom prst="flowChartConnector">
+            <a:avLst/>
+          </a:prstGeom>
+        </p:spPr>
+        <p:style>
+          <a:lnRef idx="2">
+            <a:schemeClr val="accent1">
+              <a:shade val="50000"/>
+            </a:schemeClr>
+          </a:lnRef>
+          <a:fillRef idx="1">
+            <a:schemeClr val="accent1"/>
+          </a:fillRef>
+          <a:effectRef idx="0">
+            <a:schemeClr val="accent1"/>
+          </a:effectRef>
+          <a:fontRef idx="minor">
+            <a:schemeClr val="lt1"/>
+          </a:fontRef>
+        </p:style>
         <p:txBody>
           <a:bodyPr rtlCol="0" anchor="ctr"/>
           <a:lstStyle/>
@@ -10089,7 +10743,7 @@
             <a:fld id="{3A98EE3D-8CD1-4C3F-BD1C-C98C9596463C}" type="slidenum">
               <a:rPr lang="it-IT" sz="1200" b="1"/>
               <a:pPr algn="ctr"/>
-              <a:t>10</a:t>
+              <a:t>11</a:t>
             </a:fld>
             <a:endParaRPr lang="it-IT" b="1" dirty="0"/>
           </a:p>
@@ -10097,10 +10751,10 @@
       </p:sp>
       <p:sp>
         <p:nvSpPr>
-          <p:cNvPr id="3" name="Segnaposto contenuto 2">
-            <a:extLst>
-              <a:ext uri="{FF2B5EF4-FFF2-40B4-BE49-F238E27FC236}">
-                <a16:creationId xmlns:a16="http://schemas.microsoft.com/office/drawing/2014/main" id="{CDBDD0AC-B78E-4283-B5F3-A381229EABF5}"/>
+          <p:cNvPr id="11" name="Segnaposto contenuto 2">
+            <a:extLst>
+              <a:ext uri="{FF2B5EF4-FFF2-40B4-BE49-F238E27FC236}">
+                <a16:creationId xmlns:a16="http://schemas.microsoft.com/office/drawing/2014/main" id="{693C8797-6891-414D-92DD-94A716A7F3E2}"/>
               </a:ext>
             </a:extLst>
           </p:cNvPr>
@@ -10111,17 +10765,63 @@
             <p:ph idx="1"/>
           </p:nvPr>
         </p:nvSpPr>
-        <p:spPr/>
-        <p:txBody>
-          <a:bodyPr/>
+        <p:spPr>
+          <a:xfrm>
+            <a:off x="590550" y="1452563"/>
+            <a:ext cx="10864850" cy="4707328"/>
+          </a:xfrm>
+        </p:spPr>
+        <p:txBody>
+          <a:bodyPr>
+            <a:normAutofit/>
+          </a:bodyPr>
           <a:lstStyle/>
           <a:p>
-            <a:pPr marL="0" indent="0">
-              <a:buNone/>
-            </a:pPr>
-            <a:r>
-              <a:rPr lang="it-IT" dirty="0"/>
-              <a:t>Lo </a:t>
+            <a:pPr lvl="1"/>
+            <a:r>
+              <a:rPr lang="it-IT" sz="2200" dirty="0">
+                <a:latin typeface="+mj-lt"/>
+              </a:rPr>
+              <a:t>Durante lo sviluppo della grammatica ci siamo accorti che senza una chiara distinzione dei frame è molto difficile riuscire a fare una rilevazione dei errori accurata.</a:t>
+            </a:r>
+          </a:p>
+          <a:p>
+            <a:pPr lvl="1"/>
+            <a:r>
+              <a:rPr lang="it-IT" sz="2200" dirty="0">
+                <a:latin typeface="+mj-lt"/>
+              </a:rPr>
+              <a:t>Nello standard ID3 in esame infatti non c’è una chiara distinzione tra il frame Titolo ed il frame Artista, se quindi dovesse mancare un byte nel Titolo la cosa si rifletterebbe nell’Artista e così via a causa della sequenzialità dei dati</a:t>
+            </a:r>
+          </a:p>
+          <a:p>
+            <a:pPr lvl="1"/>
+            <a:r>
+              <a:rPr lang="it-IT" sz="2200" dirty="0">
+                <a:latin typeface="+mj-lt"/>
+              </a:rPr>
+              <a:t>Per ovviare e operare una buona gestione degli errori abbiamo aggiunto allo standard l’utilizzo delle «head» con caratteri unici non utilizzabili all’interno dei frame in modo da riconoscere il tipo di errore e la sua localizzazione</a:t>
+            </a:r>
+          </a:p>
+          <a:p>
+            <a:pPr lvl="1"/>
+            <a:r>
+              <a:rPr lang="it-IT" sz="2200" dirty="0">
+                <a:latin typeface="+mj-lt"/>
+              </a:rPr>
+              <a:t>È possibile risalire ad una grammatica completamente compatibile utilizzabile per estrarre le informazioni direttamente dagli mp3 eliminando le teste, uniformando i frame (poiché ormai non c’è più differenza tra uno slot ed il successivo) ed aggiungendo nella struttura la voce di </a:t>
+            </a:r>
+            <a:r>
+              <a:rPr lang="it-IT" sz="2200" dirty="0" err="1">
+                <a:latin typeface="+mj-lt"/>
+              </a:rPr>
+              <a:t>lexer</a:t>
+            </a:r>
+            <a:r>
+              <a:rPr lang="it-IT" sz="2200" dirty="0">
+                <a:latin typeface="+mj-lt"/>
+              </a:rPr>
+              <a:t> «musica&gt; che indica al parser di saltare tutta la parte audio fino ad arrivare al riconoscimento della testa</a:t>
             </a:r>
           </a:p>
         </p:txBody>
@@ -10129,7 +10829,7 @@
     </p:spTree>
     <p:extLst>
       <p:ext uri="{BB962C8B-B14F-4D97-AF65-F5344CB8AC3E}">
-        <p14:creationId xmlns:p14="http://schemas.microsoft.com/office/powerpoint/2010/main" val="4040284531"/>
+        <p14:creationId xmlns:p14="http://schemas.microsoft.com/office/powerpoint/2010/main" val="706154318"/>
       </p:ext>
     </p:extLst>
   </p:cSld>
@@ -10139,9 +10839,17 @@
 </p:sld>
 </file>
 
-<file path=ppt/slides/slide11.xml><?xml version="1.0" encoding="utf-8"?>
+<file path=ppt/slides/slide12.xml><?xml version="1.0" encoding="utf-8"?>
 <p:sld xmlns:a="http://schemas.openxmlformats.org/drawingml/2006/main" xmlns:r="http://schemas.openxmlformats.org/officeDocument/2006/relationships" xmlns:p="http://schemas.openxmlformats.org/presentationml/2006/main">
   <p:cSld>
+    <p:bg>
+      <p:bgPr>
+        <a:solidFill>
+          <a:schemeClr val="bg1"/>
+        </a:solidFill>
+        <a:effectLst/>
+      </p:bgPr>
+    </p:bg>
     <p:spTree>
       <p:nvGrpSpPr>
         <p:cNvPr id="1" name=""/>
@@ -10158,10 +10866,180 @@
       </p:grpSpPr>
       <p:sp>
         <p:nvSpPr>
-          <p:cNvPr id="2" name="Titolo 1">
-            <a:extLst>
-              <a:ext uri="{FF2B5EF4-FFF2-40B4-BE49-F238E27FC236}">
-                <a16:creationId xmlns:a16="http://schemas.microsoft.com/office/drawing/2014/main" id="{F90817C5-BA9F-44BE-A457-FE4C2D312809}"/>
+          <p:cNvPr id="26" name="Rettangolo 28">
+            <a:extLst>
+              <a:ext uri="{FF2B5EF4-FFF2-40B4-BE49-F238E27FC236}">
+                <a16:creationId xmlns:a16="http://schemas.microsoft.com/office/drawing/2014/main" id="{416A0E3C-60E6-4F39-BC55-5F7C224E1F7C}"/>
+              </a:ext>
+              <a:ext uri="{C183D7F6-B498-43B3-948B-1728B52AA6E4}">
+                <adec:decorative xmlns:adec="http://schemas.microsoft.com/office/drawing/2017/decorative" val="1"/>
+              </a:ext>
+            </a:extLst>
+          </p:cNvPr>
+          <p:cNvSpPr>
+            <a:spLocks noGrp="1" noRot="1" noChangeAspect="1" noMove="1" noResize="1" noEditPoints="1" noAdjustHandles="1" noChangeArrowheads="1" noChangeShapeType="1" noTextEdit="1"/>
+          </p:cNvSpPr>
+          <p:nvPr>
+            <p:extLst>
+              <p:ext uri="{386F3935-93C4-4BCD-93E2-E3B085C9AB24}">
+                <p16:designElem xmlns:p16="http://schemas.microsoft.com/office/powerpoint/2015/main" val="1"/>
+              </p:ext>
+            </p:extLst>
+          </p:nvPr>
+        </p:nvSpPr>
+        <p:spPr>
+          <a:xfrm>
+            <a:off x="3175" y="6400800"/>
+            <a:ext cx="12188825" cy="457200"/>
+          </a:xfrm>
+          <a:prstGeom prst="rect">
+            <a:avLst/>
+          </a:prstGeom>
+          <a:solidFill>
+            <a:srgbClr val="262626"/>
+          </a:solidFill>
+          <a:ln>
+            <a:noFill/>
+          </a:ln>
+        </p:spPr>
+        <p:style>
+          <a:lnRef idx="2">
+            <a:schemeClr val="accent1">
+              <a:shade val="50000"/>
+            </a:schemeClr>
+          </a:lnRef>
+          <a:fillRef idx="1">
+            <a:schemeClr val="accent1"/>
+          </a:fillRef>
+          <a:effectRef idx="0">
+            <a:schemeClr val="accent1"/>
+          </a:effectRef>
+          <a:fontRef idx="minor">
+            <a:schemeClr val="lt1"/>
+          </a:fontRef>
+        </p:style>
+      </p:sp>
+      <p:cxnSp>
+        <p:nvCxnSpPr>
+          <p:cNvPr id="27" name="Connettore diritto 30">
+            <a:extLst>
+              <a:ext uri="{FF2B5EF4-FFF2-40B4-BE49-F238E27FC236}">
+                <a16:creationId xmlns:a16="http://schemas.microsoft.com/office/drawing/2014/main" id="{C5025DAC-8B93-4160-B017-3A274A5828C0}"/>
+              </a:ext>
+              <a:ext uri="{C183D7F6-B498-43B3-948B-1728B52AA6E4}">
+                <adec:decorative xmlns:adec="http://schemas.microsoft.com/office/drawing/2017/decorative" val="1"/>
+              </a:ext>
+            </a:extLst>
+          </p:cNvPr>
+          <p:cNvCxnSpPr>
+            <a:cxnSpLocks noGrp="1" noRot="1" noChangeAspect="1" noMove="1" noResize="1" noEditPoints="1" noAdjustHandles="1" noChangeArrowheads="1" noChangeShapeType="1"/>
+          </p:cNvCxnSpPr>
+          <p:nvPr>
+            <p:extLst>
+              <p:ext uri="{386F3935-93C4-4BCD-93E2-E3B085C9AB24}">
+                <p16:designElem xmlns:p16="http://schemas.microsoft.com/office/powerpoint/2015/main" val="1"/>
+              </p:ext>
+            </p:extLst>
+          </p:nvPr>
+        </p:nvCxnSpPr>
+        <p:spPr>
+          <a:xfrm>
+            <a:off x="1193532" y="1897380"/>
+            <a:ext cx="9966960" cy="0"/>
+          </a:xfrm>
+          <a:prstGeom prst="line">
+            <a:avLst/>
+          </a:prstGeom>
+          <a:ln w="12700">
+            <a:solidFill>
+              <a:schemeClr val="tx1">
+                <a:lumMod val="75000"/>
+                <a:lumOff val="25000"/>
+              </a:schemeClr>
+            </a:solidFill>
+          </a:ln>
+        </p:spPr>
+        <p:style>
+          <a:lnRef idx="1">
+            <a:schemeClr val="accent1"/>
+          </a:lnRef>
+          <a:fillRef idx="0">
+            <a:schemeClr val="accent1"/>
+          </a:fillRef>
+          <a:effectRef idx="0">
+            <a:schemeClr val="accent1"/>
+          </a:effectRef>
+          <a:fontRef idx="minor">
+            <a:schemeClr val="tx1"/>
+          </a:fontRef>
+        </p:style>
+      </p:cxnSp>
+      <p:sp useBgFill="1">
+        <p:nvSpPr>
+          <p:cNvPr id="28" name="Rettangolo 32">
+            <a:extLst>
+              <a:ext uri="{FF2B5EF4-FFF2-40B4-BE49-F238E27FC236}">
+                <a16:creationId xmlns:a16="http://schemas.microsoft.com/office/drawing/2014/main" id="{990D0034-F768-41E7-85D4-F38C4DE85770}"/>
+              </a:ext>
+              <a:ext uri="{C183D7F6-B498-43B3-948B-1728B52AA6E4}">
+                <adec:decorative xmlns:adec="http://schemas.microsoft.com/office/drawing/2017/decorative" val="1"/>
+              </a:ext>
+            </a:extLst>
+          </p:cNvPr>
+          <p:cNvSpPr>
+            <a:spLocks noGrp="1" noRot="1" noChangeAspect="1" noMove="1" noResize="1" noEditPoints="1" noAdjustHandles="1" noChangeArrowheads="1" noChangeShapeType="1" noTextEdit="1"/>
+          </p:cNvSpPr>
+          <p:nvPr>
+            <p:extLst>
+              <p:ext uri="{386F3935-93C4-4BCD-93E2-E3B085C9AB24}">
+                <p16:designElem xmlns:p16="http://schemas.microsoft.com/office/powerpoint/2015/main" val="1"/>
+              </p:ext>
+            </p:extLst>
+          </p:nvPr>
+        </p:nvSpPr>
+        <p:spPr>
+          <a:xfrm>
+            <a:off x="0" y="0"/>
+            <a:ext cx="12186315" cy="6858000"/>
+          </a:xfrm>
+          <a:prstGeom prst="rect">
+            <a:avLst/>
+          </a:prstGeom>
+          <a:ln>
+            <a:noFill/>
+          </a:ln>
+        </p:spPr>
+        <p:style>
+          <a:lnRef idx="2">
+            <a:schemeClr val="accent6">
+              <a:shade val="50000"/>
+            </a:schemeClr>
+          </a:lnRef>
+          <a:fillRef idx="1001">
+            <a:schemeClr val="lt1"/>
+          </a:fillRef>
+          <a:effectRef idx="0">
+            <a:schemeClr val="accent6"/>
+          </a:effectRef>
+          <a:fontRef idx="minor">
+            <a:schemeClr val="lt1"/>
+          </a:fontRef>
+        </p:style>
+        <p:txBody>
+          <a:bodyPr rtlCol="0" anchor="ctr"/>
+          <a:lstStyle/>
+          <a:p>
+            <a:pPr algn="ctr" rtl="0"/>
+            <a:endParaRPr lang="it-IT" dirty="0"/>
+          </a:p>
+        </p:txBody>
+      </p:sp>
+      <p:sp>
+        <p:nvSpPr>
+          <p:cNvPr id="5" name="Titolo 4">
+            <a:extLst>
+              <a:ext uri="{FF2B5EF4-FFF2-40B4-BE49-F238E27FC236}">
+                <a16:creationId xmlns:a16="http://schemas.microsoft.com/office/drawing/2014/main" id="{B8B72B13-069B-4F8A-9437-FA58C3F1D44B}"/>
               </a:ext>
             </a:extLst>
           </p:cNvPr>
@@ -10172,119 +11050,148 @@
             <p:ph type="title"/>
           </p:nvPr>
         </p:nvSpPr>
-        <p:spPr/>
-        <p:txBody>
-          <a:bodyPr/>
+        <p:spPr>
+          <a:xfrm>
+            <a:off x="590927" y="535936"/>
+            <a:ext cx="10864474" cy="700340"/>
+          </a:xfrm>
+        </p:spPr>
+        <p:txBody>
+          <a:bodyPr vert="horz" lIns="91440" tIns="45720" rIns="91440" bIns="45720" rtlCol="0" anchor="b">
+            <a:noAutofit/>
+          </a:bodyPr>
           <a:lstStyle/>
           <a:p>
-            <a:r>
-              <a:rPr lang="it-IT" dirty="0"/>
-              <a:t>Gestione degli errori</a:t>
-            </a:r>
-          </a:p>
-        </p:txBody>
-      </p:sp>
-      <p:sp>
-        <p:nvSpPr>
-          <p:cNvPr id="3" name="Segnaposto contenuto 2">
-            <a:extLst>
-              <a:ext uri="{FF2B5EF4-FFF2-40B4-BE49-F238E27FC236}">
-                <a16:creationId xmlns:a16="http://schemas.microsoft.com/office/drawing/2014/main" id="{9596A2F2-6954-40BF-B413-862D88F08506}"/>
-              </a:ext>
-            </a:extLst>
-          </p:cNvPr>
-          <p:cNvSpPr>
-            <a:spLocks noGrp="1"/>
-          </p:cNvSpPr>
-          <p:nvPr>
-            <p:ph idx="1"/>
-          </p:nvPr>
-        </p:nvSpPr>
-        <p:spPr/>
-        <p:txBody>
-          <a:bodyPr/>
+            <a:pPr rtl="0"/>
+            <a:r>
+              <a:rPr lang="it-IT" sz="4400" dirty="0">
+                <a:solidFill>
+                  <a:schemeClr val="tx1">
+                    <a:lumMod val="75000"/>
+                    <a:lumOff val="25000"/>
+                  </a:schemeClr>
+                </a:solidFill>
+              </a:rPr>
+              <a:t>Casi di test</a:t>
+            </a:r>
+          </a:p>
+        </p:txBody>
+      </p:sp>
+      <p:cxnSp>
+        <p:nvCxnSpPr>
+          <p:cNvPr id="30" name="Connettore diritto 34">
+            <a:extLst>
+              <a:ext uri="{FF2B5EF4-FFF2-40B4-BE49-F238E27FC236}">
+                <a16:creationId xmlns:a16="http://schemas.microsoft.com/office/drawing/2014/main" id="{5A0A5CF6-407C-4691-8122-49DF69D0020D}"/>
+              </a:ext>
+              <a:ext uri="{C183D7F6-B498-43B3-948B-1728B52AA6E4}">
+                <adec:decorative xmlns:adec="http://schemas.microsoft.com/office/drawing/2017/decorative" val="1"/>
+              </a:ext>
+            </a:extLst>
+          </p:cNvPr>
+          <p:cNvCxnSpPr>
+            <a:cxnSpLocks noGrp="1" noRot="1" noChangeAspect="1" noMove="1" noResize="1" noEditPoints="1" noAdjustHandles="1" noChangeArrowheads="1" noChangeShapeType="1"/>
+          </p:cNvCxnSpPr>
+          <p:nvPr>
+            <p:extLst>
+              <p:ext uri="{386F3935-93C4-4BCD-93E2-E3B085C9AB24}">
+                <p16:designElem xmlns:p16="http://schemas.microsoft.com/office/powerpoint/2015/main" val="1"/>
+              </p:ext>
+            </p:extLst>
+          </p:nvPr>
+        </p:nvCxnSpPr>
+        <p:spPr>
+          <a:xfrm>
+            <a:off x="590927" y="2633962"/>
+            <a:ext cx="2834640" cy="0"/>
+          </a:xfrm>
+          <a:prstGeom prst="line">
+            <a:avLst/>
+          </a:prstGeom>
+          <a:ln w="12700">
+            <a:solidFill>
+              <a:schemeClr val="tx1">
+                <a:lumMod val="75000"/>
+                <a:lumOff val="25000"/>
+              </a:schemeClr>
+            </a:solidFill>
+          </a:ln>
+        </p:spPr>
+        <p:style>
+          <a:lnRef idx="1">
+            <a:schemeClr val="accent1"/>
+          </a:lnRef>
+          <a:fillRef idx="0">
+            <a:schemeClr val="accent1"/>
+          </a:fillRef>
+          <a:effectRef idx="0">
+            <a:schemeClr val="accent1"/>
+          </a:effectRef>
+          <a:fontRef idx="minor">
+            <a:schemeClr val="tx1"/>
+          </a:fontRef>
+        </p:style>
+      </p:cxnSp>
+      <p:sp>
+        <p:nvSpPr>
+          <p:cNvPr id="4" name="Rettangolo 3">
+            <a:extLst>
+              <a:ext uri="{FF2B5EF4-FFF2-40B4-BE49-F238E27FC236}">
+                <a16:creationId xmlns:a16="http://schemas.microsoft.com/office/drawing/2014/main" id="{D22E5227-66DC-4545-A93A-3BAE57987144}"/>
+              </a:ext>
+            </a:extLst>
+          </p:cNvPr>
+          <p:cNvSpPr/>
+          <p:nvPr/>
+        </p:nvSpPr>
+        <p:spPr>
+          <a:xfrm>
+            <a:off x="590927" y="2477070"/>
+            <a:ext cx="2955837" cy="457195"/>
+          </a:xfrm>
+          <a:prstGeom prst="rect">
+            <a:avLst/>
+          </a:prstGeom>
+          <a:solidFill>
+            <a:schemeClr val="bg1"/>
+          </a:solidFill>
+          <a:ln>
+            <a:solidFill>
+              <a:schemeClr val="bg1"/>
+            </a:solidFill>
+          </a:ln>
+        </p:spPr>
+        <p:style>
+          <a:lnRef idx="2">
+            <a:schemeClr val="accent1">
+              <a:shade val="50000"/>
+            </a:schemeClr>
+          </a:lnRef>
+          <a:fillRef idx="1">
+            <a:schemeClr val="accent1"/>
+          </a:fillRef>
+          <a:effectRef idx="0">
+            <a:schemeClr val="accent1"/>
+          </a:effectRef>
+          <a:fontRef idx="minor">
+            <a:schemeClr val="lt1"/>
+          </a:fontRef>
+        </p:style>
+        <p:txBody>
+          <a:bodyPr rtlCol="0" anchor="ctr"/>
           <a:lstStyle/>
           <a:p>
-            <a:r>
-              <a:rPr lang="it-IT" sz="2400" dirty="0">
-                <a:latin typeface="+mj-lt"/>
-              </a:rPr>
-              <a:t>Vengono effettuati controlli sulla presenza e correttezza degli </a:t>
-            </a:r>
-            <a:r>
-              <a:rPr lang="it-IT" sz="2400" dirty="0" err="1">
-                <a:latin typeface="+mj-lt"/>
-              </a:rPr>
-              <a:t>Header</a:t>
-            </a:r>
-            <a:r>
-              <a:rPr lang="it-IT" sz="2400" dirty="0">
-                <a:latin typeface="+mj-lt"/>
-              </a:rPr>
-              <a:t> e si controlla che ogni campo contenente le informazioni del brano sia di lunghezza pari a 30 caratteri.</a:t>
-            </a:r>
-          </a:p>
-          <a:p>
-            <a:endParaRPr lang="it-IT" dirty="0"/>
-          </a:p>
-          <a:p>
-            <a:r>
-              <a:rPr lang="it-IT" sz="2400" dirty="0">
-                <a:latin typeface="+mj-lt"/>
-              </a:rPr>
-              <a:t>Alcuni esempi:</a:t>
-            </a:r>
-          </a:p>
-          <a:p>
-            <a:pPr lvl="1"/>
-            <a:r>
-              <a:rPr lang="it-IT" sz="2200" dirty="0">
-                <a:latin typeface="+mj-lt"/>
-              </a:rPr>
-              <a:t>Mancanza o errata scrittura del TAG iniziale</a:t>
-            </a:r>
-          </a:p>
-          <a:p>
-            <a:endParaRPr lang="it-IT" dirty="0"/>
-          </a:p>
-        </p:txBody>
-      </p:sp>
-      <p:sp>
-        <p:nvSpPr>
-          <p:cNvPr id="4" name="Segnaposto numero diapositiva 3">
-            <a:extLst>
-              <a:ext uri="{FF2B5EF4-FFF2-40B4-BE49-F238E27FC236}">
-                <a16:creationId xmlns:a16="http://schemas.microsoft.com/office/drawing/2014/main" id="{2B13E80C-7F0E-4294-A3F9-CBF165A75956}"/>
-              </a:ext>
-            </a:extLst>
-          </p:cNvPr>
-          <p:cNvSpPr>
-            <a:spLocks noGrp="1"/>
-          </p:cNvSpPr>
-          <p:nvPr>
-            <p:ph type="sldNum" sz="quarter" idx="12"/>
-          </p:nvPr>
-        </p:nvSpPr>
-        <p:spPr/>
-        <p:txBody>
-          <a:bodyPr/>
-          <a:lstStyle/>
-          <a:p>
-            <a:pPr rtl="0"/>
-            <a:fld id="{3A98EE3D-8CD1-4C3F-BD1C-C98C9596463C}" type="slidenum">
-              <a:rPr lang="it-IT" noProof="0" smtClean="0"/>
-              <a:t>11</a:t>
-            </a:fld>
-            <a:endParaRPr lang="it-IT" noProof="0" dirty="0"/>
+            <a:pPr algn="ctr"/>
+            <a:endParaRPr lang="it-IT"/>
           </a:p>
         </p:txBody>
       </p:sp>
       <p:pic>
         <p:nvPicPr>
-          <p:cNvPr id="6" name="Immagine 5">
-            <a:extLst>
-              <a:ext uri="{FF2B5EF4-FFF2-40B4-BE49-F238E27FC236}">
-                <a16:creationId xmlns:a16="http://schemas.microsoft.com/office/drawing/2014/main" id="{D6A62E99-94CE-4219-B69B-E1B6C2FA2D4F}"/>
+          <p:cNvPr id="10" name="Elemento grafico 9">
+            <a:extLst>
+              <a:ext uri="{FF2B5EF4-FFF2-40B4-BE49-F238E27FC236}">
+                <a16:creationId xmlns:a16="http://schemas.microsoft.com/office/drawing/2014/main" id="{54A47743-7725-4A33-93CA-EFB89C10D1EC}"/>
               </a:ext>
             </a:extLst>
           </p:cNvPr>
@@ -10294,15 +11201,177 @@
           <p:nvPr/>
         </p:nvPicPr>
         <p:blipFill>
-          <a:blip r:embed="rId2"/>
+          <a:blip r:embed="rId3" cstate="print">
+            <a:extLst>
+              <a:ext uri="{28A0092B-C50C-407E-A947-70E740481C1C}">
+                <a14:useLocalDpi xmlns:a14="http://schemas.microsoft.com/office/drawing/2010/main" val="0"/>
+              </a:ext>
+              <a:ext uri="{96DAC541-7B7A-43D3-8B79-37D633B846F1}">
+                <asvg:svgBlip xmlns:asvg="http://schemas.microsoft.com/office/drawing/2016/SVG/main" r:embed="rId4"/>
+              </a:ext>
+            </a:extLst>
+          </a:blip>
           <a:stretch>
             <a:fillRect/>
           </a:stretch>
         </p:blipFill>
         <p:spPr>
           <a:xfrm>
-            <a:off x="1689713" y="4941946"/>
-            <a:ext cx="9112070" cy="480285"/>
+            <a:off x="207095" y="6043750"/>
+            <a:ext cx="1770209" cy="700341"/>
+          </a:xfrm>
+          <a:prstGeom prst="rect">
+            <a:avLst/>
+          </a:prstGeom>
+        </p:spPr>
+      </p:pic>
+      <p:sp>
+        <p:nvSpPr>
+          <p:cNvPr id="12" name="Connettore 11">
+            <a:extLst>
+              <a:ext uri="{FF2B5EF4-FFF2-40B4-BE49-F238E27FC236}">
+                <a16:creationId xmlns:a16="http://schemas.microsoft.com/office/drawing/2014/main" id="{92095D8C-8CCA-4CC6-B2D2-E1BC4732F321}"/>
+              </a:ext>
+            </a:extLst>
+          </p:cNvPr>
+          <p:cNvSpPr/>
+          <p:nvPr/>
+        </p:nvSpPr>
+        <p:spPr>
+          <a:xfrm>
+            <a:off x="11455401" y="6273800"/>
+            <a:ext cx="512910" cy="470291"/>
+          </a:xfrm>
+          <a:prstGeom prst="flowChartConnector">
+            <a:avLst/>
+          </a:prstGeom>
+        </p:spPr>
+        <p:style>
+          <a:lnRef idx="2">
+            <a:schemeClr val="accent1">
+              <a:shade val="50000"/>
+            </a:schemeClr>
+          </a:lnRef>
+          <a:fillRef idx="1">
+            <a:schemeClr val="accent1"/>
+          </a:fillRef>
+          <a:effectRef idx="0">
+            <a:schemeClr val="accent1"/>
+          </a:effectRef>
+          <a:fontRef idx="minor">
+            <a:schemeClr val="lt1"/>
+          </a:fontRef>
+        </p:style>
+        <p:txBody>
+          <a:bodyPr rtlCol="0" anchor="ctr"/>
+          <a:lstStyle/>
+          <a:p>
+            <a:pPr algn="ctr"/>
+            <a:fld id="{3A98EE3D-8CD1-4C3F-BD1C-C98C9596463C}" type="slidenum">
+              <a:rPr lang="it-IT" sz="1200" b="1"/>
+              <a:pPr algn="ctr"/>
+              <a:t>12</a:t>
+            </a:fld>
+            <a:endParaRPr lang="it-IT" b="1" dirty="0"/>
+          </a:p>
+        </p:txBody>
+      </p:sp>
+      <p:sp>
+        <p:nvSpPr>
+          <p:cNvPr id="11" name="Segnaposto contenuto 2">
+            <a:extLst>
+              <a:ext uri="{FF2B5EF4-FFF2-40B4-BE49-F238E27FC236}">
+                <a16:creationId xmlns:a16="http://schemas.microsoft.com/office/drawing/2014/main" id="{693C8797-6891-414D-92DD-94A716A7F3E2}"/>
+              </a:ext>
+            </a:extLst>
+          </p:cNvPr>
+          <p:cNvSpPr>
+            <a:spLocks noGrp="1"/>
+          </p:cNvSpPr>
+          <p:nvPr>
+            <p:ph idx="1"/>
+          </p:nvPr>
+        </p:nvSpPr>
+        <p:spPr>
+          <a:xfrm>
+            <a:off x="590550" y="1452563"/>
+            <a:ext cx="10864850" cy="4591050"/>
+          </a:xfrm>
+        </p:spPr>
+        <p:txBody>
+          <a:bodyPr>
+            <a:normAutofit/>
+          </a:bodyPr>
+          <a:lstStyle/>
+          <a:p>
+            <a:pPr lvl="1"/>
+            <a:r>
+              <a:rPr lang="it-IT" sz="2200" dirty="0">
+                <a:latin typeface="+mj-lt"/>
+              </a:rPr>
+              <a:t>Mancanza o errata scrittura di un qualsiasi </a:t>
+            </a:r>
+            <a:r>
+              <a:rPr lang="it-IT" sz="2200" dirty="0" err="1">
+                <a:latin typeface="+mj-lt"/>
+              </a:rPr>
+              <a:t>Header</a:t>
+            </a:r>
+            <a:endParaRPr lang="it-IT" sz="2200" dirty="0">
+              <a:latin typeface="+mj-lt"/>
+            </a:endParaRPr>
+          </a:p>
+          <a:p>
+            <a:pPr marL="201168" lvl="1" indent="0">
+              <a:buNone/>
+            </a:pPr>
+            <a:endParaRPr lang="it-IT" sz="2200" dirty="0">
+              <a:latin typeface="+mj-lt"/>
+            </a:endParaRPr>
+          </a:p>
+          <a:p>
+            <a:pPr marL="201168" lvl="1" indent="0">
+              <a:buNone/>
+            </a:pPr>
+            <a:endParaRPr lang="it-IT" sz="2200" dirty="0">
+              <a:latin typeface="+mj-lt"/>
+            </a:endParaRPr>
+          </a:p>
+          <a:p>
+            <a:pPr lvl="1"/>
+            <a:r>
+              <a:rPr lang="it-IT" sz="2200" dirty="0">
+                <a:latin typeface="+mj-lt"/>
+              </a:rPr>
+              <a:t>Campo contenente le informazioni della traccia di lunghezza minore rispetto ai 30 caratteri obbligatori</a:t>
+            </a:r>
+          </a:p>
+        </p:txBody>
+      </p:sp>
+      <p:pic>
+        <p:nvPicPr>
+          <p:cNvPr id="13" name="Immagine 12">
+            <a:extLst>
+              <a:ext uri="{FF2B5EF4-FFF2-40B4-BE49-F238E27FC236}">
+                <a16:creationId xmlns:a16="http://schemas.microsoft.com/office/drawing/2014/main" id="{2126C17A-AF82-4602-84E7-97D61BF9048C}"/>
+              </a:ext>
+            </a:extLst>
+          </p:cNvPr>
+          <p:cNvPicPr>
+            <a:picLocks noChangeAspect="1"/>
+          </p:cNvPicPr>
+          <p:nvPr/>
+        </p:nvPicPr>
+        <p:blipFill>
+          <a:blip r:embed="rId5"/>
+          <a:stretch>
+            <a:fillRect/>
+          </a:stretch>
+        </p:blipFill>
+        <p:spPr>
+          <a:xfrm>
+            <a:off x="904118" y="1998688"/>
+            <a:ext cx="7923143" cy="571774"/>
           </a:xfrm>
           <a:prstGeom prst="rect">
             <a:avLst/>
@@ -10312,7 +11381,7 @@
     </p:spTree>
     <p:extLst>
       <p:ext uri="{BB962C8B-B14F-4D97-AF65-F5344CB8AC3E}">
-        <p14:creationId xmlns:p14="http://schemas.microsoft.com/office/powerpoint/2010/main" val="2079372548"/>
+        <p14:creationId xmlns:p14="http://schemas.microsoft.com/office/powerpoint/2010/main" val="2676566520"/>
       </p:ext>
     </p:extLst>
   </p:cSld>
@@ -10322,9 +11391,17 @@
 </p:sld>
 </file>
 
-<file path=ppt/slides/slide12.xml><?xml version="1.0" encoding="utf-8"?>
+<file path=ppt/slides/slide13.xml><?xml version="1.0" encoding="utf-8"?>
 <p:sld xmlns:a="http://schemas.openxmlformats.org/drawingml/2006/main" xmlns:r="http://schemas.openxmlformats.org/officeDocument/2006/relationships" xmlns:p="http://schemas.openxmlformats.org/presentationml/2006/main">
   <p:cSld>
+    <p:bg>
+      <p:bgPr>
+        <a:solidFill>
+          <a:schemeClr val="bg1"/>
+        </a:solidFill>
+        <a:effectLst/>
+      </p:bgPr>
+    </p:bg>
     <p:spTree>
       <p:nvGrpSpPr>
         <p:cNvPr id="1" name=""/>
@@ -10341,10 +11418,10 @@
       </p:grpSpPr>
       <p:sp>
         <p:nvSpPr>
-          <p:cNvPr id="2" name="Titolo 1">
-            <a:extLst>
-              <a:ext uri="{FF2B5EF4-FFF2-40B4-BE49-F238E27FC236}">
-                <a16:creationId xmlns:a16="http://schemas.microsoft.com/office/drawing/2014/main" id="{8F3A6E8D-C6E3-45A3-87D8-838CC3B5CA73}"/>
+          <p:cNvPr id="6" name="Titolo 5">
+            <a:extLst>
+              <a:ext uri="{FF2B5EF4-FFF2-40B4-BE49-F238E27FC236}">
+                <a16:creationId xmlns:a16="http://schemas.microsoft.com/office/drawing/2014/main" id="{CE09A200-4838-4284-BD1E-19701CABB5FE}"/>
               </a:ext>
             </a:extLst>
           </p:cNvPr>
@@ -10355,123 +11432,32 @@
             <p:ph type="title"/>
           </p:nvPr>
         </p:nvSpPr>
-        <p:spPr/>
-        <p:txBody>
-          <a:bodyPr/>
-          <a:lstStyle/>
-          <a:p>
-            <a:r>
-              <a:rPr lang="it-IT" dirty="0"/>
-              <a:t>Gestione degli errori</a:t>
-            </a:r>
-          </a:p>
-        </p:txBody>
-      </p:sp>
-      <p:sp>
-        <p:nvSpPr>
-          <p:cNvPr id="3" name="Segnaposto contenuto 2">
-            <a:extLst>
-              <a:ext uri="{FF2B5EF4-FFF2-40B4-BE49-F238E27FC236}">
-                <a16:creationId xmlns:a16="http://schemas.microsoft.com/office/drawing/2014/main" id="{4A41F902-07A3-46A2-9065-80907DC9C068}"/>
-              </a:ext>
-            </a:extLst>
-          </p:cNvPr>
-          <p:cNvSpPr>
-            <a:spLocks noGrp="1"/>
-          </p:cNvSpPr>
-          <p:nvPr>
-            <p:ph idx="1"/>
-          </p:nvPr>
-        </p:nvSpPr>
-        <p:spPr/>
-        <p:txBody>
-          <a:bodyPr>
+        <p:spPr>
+          <a:xfrm>
+            <a:off x="1097280" y="286603"/>
+            <a:ext cx="10058400" cy="1450757"/>
+          </a:xfrm>
+        </p:spPr>
+        <p:txBody>
+          <a:bodyPr rtlCol="0">
             <a:normAutofit/>
           </a:bodyPr>
           <a:lstStyle/>
           <a:p>
-            <a:pPr lvl="1"/>
-            <a:r>
-              <a:rPr lang="it-IT" sz="2200" dirty="0">
-                <a:latin typeface="+mj-lt"/>
-              </a:rPr>
-              <a:t>Mancanza o errata scrittura di un qualsiasi </a:t>
-            </a:r>
-            <a:r>
-              <a:rPr lang="it-IT" sz="2200" dirty="0" err="1">
-                <a:latin typeface="+mj-lt"/>
-              </a:rPr>
-              <a:t>Header</a:t>
-            </a:r>
-            <a:endParaRPr lang="it-IT" sz="2200" dirty="0">
-              <a:latin typeface="+mj-lt"/>
-            </a:endParaRPr>
-          </a:p>
-          <a:p>
-            <a:pPr lvl="1"/>
-            <a:endParaRPr lang="it-IT" sz="2200" dirty="0">
-              <a:latin typeface="+mj-lt"/>
-            </a:endParaRPr>
-          </a:p>
-          <a:p>
-            <a:pPr lvl="1"/>
-            <a:endParaRPr lang="it-IT" sz="2200" dirty="0">
-              <a:latin typeface="+mj-lt"/>
-            </a:endParaRPr>
-          </a:p>
-          <a:p>
-            <a:pPr lvl="1"/>
-            <a:endParaRPr lang="it-IT" sz="2200" dirty="0">
-              <a:latin typeface="+mj-lt"/>
-            </a:endParaRPr>
-          </a:p>
-          <a:p>
-            <a:pPr lvl="1"/>
-            <a:r>
-              <a:rPr lang="it-IT" sz="2200" dirty="0">
-                <a:latin typeface="+mj-lt"/>
-              </a:rPr>
-              <a:t>Campo contenente le informazioni della traccia di lunghezza minore rispetto ai 30 caratteri obbligatori</a:t>
-            </a:r>
-          </a:p>
-        </p:txBody>
-      </p:sp>
-      <p:sp>
-        <p:nvSpPr>
-          <p:cNvPr id="4" name="Segnaposto numero diapositiva 3">
-            <a:extLst>
-              <a:ext uri="{FF2B5EF4-FFF2-40B4-BE49-F238E27FC236}">
-                <a16:creationId xmlns:a16="http://schemas.microsoft.com/office/drawing/2014/main" id="{81F7F39F-B717-4FA0-8BE8-02FF46A5F303}"/>
-              </a:ext>
-            </a:extLst>
-          </p:cNvPr>
-          <p:cNvSpPr>
-            <a:spLocks noGrp="1"/>
-          </p:cNvSpPr>
-          <p:nvPr>
-            <p:ph type="sldNum" sz="quarter" idx="12"/>
-          </p:nvPr>
-        </p:nvSpPr>
-        <p:spPr/>
-        <p:txBody>
-          <a:bodyPr/>
-          <a:lstStyle/>
-          <a:p>
             <a:pPr rtl="0"/>
-            <a:fld id="{3A98EE3D-8CD1-4C3F-BD1C-C98C9596463C}" type="slidenum">
-              <a:rPr lang="it-IT" noProof="0" smtClean="0"/>
-              <a:t>12</a:t>
-            </a:fld>
-            <a:endParaRPr lang="it-IT" noProof="0" dirty="0"/>
+            <a:r>
+              <a:rPr lang="it-IT" dirty="0"/>
+              <a:t>Grammatica con non terminali</a:t>
+            </a:r>
           </a:p>
         </p:txBody>
       </p:sp>
       <p:pic>
         <p:nvPicPr>
-          <p:cNvPr id="6" name="Immagine 5">
-            <a:extLst>
-              <a:ext uri="{FF2B5EF4-FFF2-40B4-BE49-F238E27FC236}">
-                <a16:creationId xmlns:a16="http://schemas.microsoft.com/office/drawing/2014/main" id="{49427C53-1231-49B0-84CE-63995E1F66AC}"/>
+          <p:cNvPr id="4" name="Elemento grafico 3">
+            <a:extLst>
+              <a:ext uri="{FF2B5EF4-FFF2-40B4-BE49-F238E27FC236}">
+                <a16:creationId xmlns:a16="http://schemas.microsoft.com/office/drawing/2014/main" id="{ED0A95A1-BC85-4809-B935-6A9B3C054422}"/>
               </a:ext>
             </a:extLst>
           </p:cNvPr>
@@ -10481,25 +11467,116 @@
           <p:nvPr/>
         </p:nvPicPr>
         <p:blipFill>
-          <a:blip r:embed="rId2"/>
+          <a:blip r:embed="rId3" cstate="print">
+            <a:extLst>
+              <a:ext uri="{28A0092B-C50C-407E-A947-70E740481C1C}">
+                <a14:useLocalDpi xmlns:a14="http://schemas.microsoft.com/office/drawing/2010/main" val="0"/>
+              </a:ext>
+              <a:ext uri="{96DAC541-7B7A-43D3-8B79-37D633B846F1}">
+                <asvg:svgBlip xmlns:asvg="http://schemas.microsoft.com/office/drawing/2016/SVG/main" r:embed="rId4"/>
+              </a:ext>
+            </a:extLst>
+          </a:blip>
           <a:stretch>
             <a:fillRect/>
           </a:stretch>
         </p:blipFill>
         <p:spPr>
           <a:xfrm>
-            <a:off x="1957064" y="2857226"/>
-            <a:ext cx="7923143" cy="571774"/>
+            <a:off x="207095" y="6043750"/>
+            <a:ext cx="1770209" cy="700341"/>
           </a:xfrm>
           <a:prstGeom prst="rect">
             <a:avLst/>
           </a:prstGeom>
         </p:spPr>
       </p:pic>
+      <p:sp>
+        <p:nvSpPr>
+          <p:cNvPr id="10" name="Connettore 9">
+            <a:extLst>
+              <a:ext uri="{FF2B5EF4-FFF2-40B4-BE49-F238E27FC236}">
+                <a16:creationId xmlns:a16="http://schemas.microsoft.com/office/drawing/2014/main" id="{7DA3C5E2-1B7C-406E-9A80-B7F344044586}"/>
+              </a:ext>
+            </a:extLst>
+          </p:cNvPr>
+          <p:cNvSpPr/>
+          <p:nvPr/>
+        </p:nvSpPr>
+        <p:spPr>
+          <a:xfrm>
+            <a:off x="11455401" y="6273800"/>
+            <a:ext cx="512910" cy="470291"/>
+          </a:xfrm>
+          <a:prstGeom prst="flowChartConnector">
+            <a:avLst/>
+          </a:prstGeom>
+        </p:spPr>
+        <p:style>
+          <a:lnRef idx="2">
+            <a:schemeClr val="accent1">
+              <a:shade val="50000"/>
+            </a:schemeClr>
+          </a:lnRef>
+          <a:fillRef idx="1">
+            <a:schemeClr val="accent1"/>
+          </a:fillRef>
+          <a:effectRef idx="0">
+            <a:schemeClr val="accent1"/>
+          </a:effectRef>
+          <a:fontRef idx="minor">
+            <a:schemeClr val="lt1"/>
+          </a:fontRef>
+        </p:style>
+        <p:txBody>
+          <a:bodyPr rtlCol="0" anchor="ctr"/>
+          <a:lstStyle/>
+          <a:p>
+            <a:pPr algn="ctr"/>
+            <a:fld id="{3A98EE3D-8CD1-4C3F-BD1C-C98C9596463C}" type="slidenum">
+              <a:rPr lang="it-IT" sz="1200" b="1"/>
+              <a:pPr algn="ctr"/>
+              <a:t>13</a:t>
+            </a:fld>
+            <a:endParaRPr lang="it-IT" b="1" dirty="0"/>
+          </a:p>
+        </p:txBody>
+      </p:sp>
+      <p:sp>
+        <p:nvSpPr>
+          <p:cNvPr id="3" name="Segnaposto contenuto 2">
+            <a:extLst>
+              <a:ext uri="{FF2B5EF4-FFF2-40B4-BE49-F238E27FC236}">
+                <a16:creationId xmlns:a16="http://schemas.microsoft.com/office/drawing/2014/main" id="{CDBDD0AC-B78E-4283-B5F3-A381229EABF5}"/>
+              </a:ext>
+            </a:extLst>
+          </p:cNvPr>
+          <p:cNvSpPr>
+            <a:spLocks noGrp="1"/>
+          </p:cNvSpPr>
+          <p:nvPr>
+            <p:ph idx="1"/>
+          </p:nvPr>
+        </p:nvSpPr>
+        <p:spPr/>
+        <p:txBody>
+          <a:bodyPr/>
+          <a:lstStyle/>
+          <a:p>
+            <a:pPr marL="0" indent="0">
+              <a:buNone/>
+            </a:pPr>
+            <a:r>
+              <a:rPr lang="it-IT" dirty="0"/>
+              <a:t>Lo </a:t>
+            </a:r>
+          </a:p>
+        </p:txBody>
+      </p:sp>
     </p:spTree>
     <p:extLst>
       <p:ext uri="{BB962C8B-B14F-4D97-AF65-F5344CB8AC3E}">
-        <p14:creationId xmlns:p14="http://schemas.microsoft.com/office/powerpoint/2010/main" val="2494057067"/>
+        <p14:creationId xmlns:p14="http://schemas.microsoft.com/office/powerpoint/2010/main" val="4040284531"/>
       </p:ext>
     </p:extLst>
   </p:cSld>
@@ -10509,7 +11586,7 @@
 </p:sld>
 </file>
 
-<file path=ppt/slides/slide13.xml><?xml version="1.0" encoding="utf-8"?>
+<file path=ppt/slides/slide14.xml><?xml version="1.0" encoding="utf-8"?>
 <p:sld xmlns:a="http://schemas.openxmlformats.org/drawingml/2006/main" xmlns:r="http://schemas.openxmlformats.org/officeDocument/2006/relationships" xmlns:p="http://schemas.openxmlformats.org/presentationml/2006/main">
   <p:cSld>
     <p:spTree>
@@ -10902,7 +11979,7 @@
               <a:rPr lang="it-IT" sz="1600" dirty="0">
                 <a:latin typeface="+mj-lt"/>
               </a:rPr>
-              <a:t>A</a:t>
+              <a:t>Descrizione</a:t>
             </a:r>
           </a:p>
           <a:p>
@@ -10919,7 +11996,7 @@
               <a:rPr lang="it-IT" sz="1600" dirty="0">
                 <a:latin typeface="+mj-lt"/>
               </a:rPr>
-              <a:t>N</a:t>
+              <a:t>Casi di Test</a:t>
             </a:r>
           </a:p>
           <a:p>
@@ -10938,6 +12015,20 @@
               </a:rPr>
               <a:t>M</a:t>
             </a:r>
+          </a:p>
+          <a:p>
+            <a:pPr marL="0" indent="0" rtl="0">
+              <a:spcBef>
+                <a:spcPts val="0"/>
+              </a:spcBef>
+              <a:spcAft>
+                <a:spcPts val="0"/>
+              </a:spcAft>
+              <a:buNone/>
+            </a:pPr>
+            <a:endParaRPr lang="it-IT" sz="1600" dirty="0">
+              <a:latin typeface="+mj-lt"/>
+            </a:endParaRPr>
           </a:p>
           <a:p>
             <a:pPr marL="0" indent="0" rtl="0">
@@ -16037,6 +17128,15 @@
 </file>
 
 <file path=customXml/item1.xml><?xml version="1.0" encoding="utf-8"?>
+<?mso-contentType ?>
+<FormTemplates xmlns="http://schemas.microsoft.com/sharepoint/v3/contenttype/forms">
+  <Display>DocumentLibraryForm</Display>
+  <Edit>DocumentLibraryForm</Edit>
+  <New>DocumentLibraryForm</New>
+</FormTemplates>
+</file>
+
+<file path=customXml/item2.xml><?xml version="1.0" encoding="utf-8"?>
 <ct:contentTypeSchema xmlns:ct="http://schemas.microsoft.com/office/2006/metadata/contentType" xmlns:ma="http://schemas.microsoft.com/office/2006/metadata/properties/metaAttributes" ct:_="" ma:_="" ma:contentTypeName="Document" ma:contentTypeID="0x01010079F111ED35F8CC479449609E8A0923A6" ma:contentTypeVersion="12" ma:contentTypeDescription="Create a new document." ma:contentTypeScope="" ma:versionID="fa6e671f1cd7e4d96ff9652be322dd5e">
   <xsd:schema xmlns:xsd="http://www.w3.org/2001/XMLSchema" xmlns:xs="http://www.w3.org/2001/XMLSchema" xmlns:p="http://schemas.microsoft.com/office/2006/metadata/properties" xmlns:ns2="71af3243-3dd4-4a8d-8c0d-dd76da1f02a5" xmlns:ns3="16c05727-aa75-4e4a-9b5f-8a80a1165891" targetNamespace="http://schemas.microsoft.com/office/2006/metadata/properties" ma:root="true" ma:fieldsID="4e2496f70b101db0b8013f30a071bbf7" ns2:_="" ns3:_="">
     <xsd:import namespace="71af3243-3dd4-4a8d-8c0d-dd76da1f02a5"/>
@@ -16257,15 +17357,6 @@
 </ct:contentTypeSchema>
 </file>
 
-<file path=customXml/item2.xml><?xml version="1.0" encoding="utf-8"?>
-<?mso-contentType ?>
-<FormTemplates xmlns="http://schemas.microsoft.com/sharepoint/v3/contenttype/forms">
-  <Display>DocumentLibraryForm</Display>
-  <Edit>DocumentLibraryForm</Edit>
-  <New>DocumentLibraryForm</New>
-</FormTemplates>
-</file>
-
 <file path=customXml/item3.xml><?xml version="1.0" encoding="utf-8"?>
 <p:properties xmlns:p="http://schemas.microsoft.com/office/2006/metadata/properties" xmlns:xsi="http://www.w3.org/2001/XMLSchema-instance" xmlns:pc="http://schemas.microsoft.com/office/infopath/2007/PartnerControls">
   <documentManagement>
@@ -16276,6 +17367,14 @@
 </file>
 
 <file path=customXml/itemProps1.xml><?xml version="1.0" encoding="utf-8"?>
+<ds:datastoreItem xmlns:ds="http://schemas.openxmlformats.org/officeDocument/2006/customXml" ds:itemID="{7E0A2CB4-6869-426F-8BC4-A32C90CBE263}">
+  <ds:schemaRefs>
+    <ds:schemaRef ds:uri="http://schemas.microsoft.com/sharepoint/v3/contenttype/forms"/>
+  </ds:schemaRefs>
+</ds:datastoreItem>
+</file>
+
+<file path=customXml/itemProps2.xml><?xml version="1.0" encoding="utf-8"?>
 <ds:datastoreItem xmlns:ds="http://schemas.openxmlformats.org/officeDocument/2006/customXml" ds:itemID="{A941CA7C-A0BF-44EF-B2E5-7539C3B9B0B6}">
   <ds:schemaRefs>
     <ds:schemaRef ds:uri="http://schemas.microsoft.com/office/2006/metadata/contentType"/>
@@ -16294,14 +17393,6 @@
 </ds:datastoreItem>
 </file>
 
-<file path=customXml/itemProps2.xml><?xml version="1.0" encoding="utf-8"?>
-<ds:datastoreItem xmlns:ds="http://schemas.openxmlformats.org/officeDocument/2006/customXml" ds:itemID="{7E0A2CB4-6869-426F-8BC4-A32C90CBE263}">
-  <ds:schemaRefs>
-    <ds:schemaRef ds:uri="http://schemas.microsoft.com/sharepoint/v3/contenttype/forms"/>
-  </ds:schemaRefs>
-</ds:datastoreItem>
-</file>
-
 <file path=customXml/itemProps3.xml><?xml version="1.0" encoding="utf-8"?>
 <ds:datastoreItem xmlns:ds="http://schemas.openxmlformats.org/officeDocument/2006/customXml" ds:itemID="{A4E879E6-8FFE-4154-8F2A-F7518B89B376}">
   <ds:schemaRefs>

</xml_diff>